<commit_message>
Reorganized file strucutre. Data now inside of Data/ folder. Most in Data/OtherData
Added in checkpoints for saving data and loading data to maek running models after crashes faster and to use less memory.

made loops more robust. Fixed problem in testing data where I used the wrong loop

Removed unneccessary files

Added writing folder for text

Updated presentation slightly

renamed variables in data processing to use less memory and make the environment less cluttered
</commit_message>
<xml_diff>
--- a/ThesisPresentation.pptx
+++ b/ThesisPresentation.pptx
@@ -22,7 +22,7 @@
     <p:sldId id="282" r:id="rId13"/>
   </p:sldIdLst>
   <p:sldSz cx="12192000" cy="6858000"/>
-  <p:notesSz cx="6858000" cy="9144000"/>
+  <p:notesSz cx="7010400" cy="9296400"/>
   <p:defaultTextStyle>
     <a:defPPr>
       <a:defRPr lang="en-US"/>
@@ -187,14 +187,14 @@
         <p:spPr>
           <a:xfrm>
             <a:off x="0" y="0"/>
-            <a:ext cx="2971800" cy="458788"/>
+            <a:ext cx="3037840" cy="466434"/>
           </a:xfrm>
           <a:prstGeom prst="rect">
             <a:avLst/>
           </a:prstGeom>
         </p:spPr>
         <p:txBody>
-          <a:bodyPr vert="horz" lIns="91440" tIns="45720" rIns="91440" bIns="45720" rtlCol="0"/>
+          <a:bodyPr vert="horz" lIns="93172" tIns="46587" rIns="93172" bIns="46587" rtlCol="0"/>
           <a:lstStyle>
             <a:lvl1pPr algn="l">
               <a:defRPr sz="1200"/>
@@ -223,15 +223,15 @@
         </p:nvSpPr>
         <p:spPr>
           <a:xfrm>
-            <a:off x="3884613" y="0"/>
-            <a:ext cx="2971800" cy="458788"/>
+            <a:off x="3970938" y="0"/>
+            <a:ext cx="3037840" cy="466434"/>
           </a:xfrm>
           <a:prstGeom prst="rect">
             <a:avLst/>
           </a:prstGeom>
         </p:spPr>
         <p:txBody>
-          <a:bodyPr vert="horz" lIns="91440" tIns="45720" rIns="91440" bIns="45720" rtlCol="0"/>
+          <a:bodyPr vert="horz" lIns="93172" tIns="46587" rIns="93172" bIns="46587" rtlCol="0"/>
           <a:lstStyle>
             <a:lvl1pPr algn="r">
               <a:defRPr sz="1200"/>
@@ -240,7 +240,7 @@
           <a:p>
             <a:fld id="{B56F32FC-4BD9-442A-A8C6-51598C909FE3}" type="datetimeFigureOut">
               <a:rPr lang="en-US" smtClean="0"/>
-              <a:t>12/1/2021</a:t>
+              <a:t>12/2/2021</a:t>
             </a:fld>
             <a:endParaRPr lang="en-US" dirty="0"/>
           </a:p>
@@ -264,15 +264,15 @@
         </p:nvSpPr>
         <p:spPr>
           <a:xfrm>
-            <a:off x="0" y="8685213"/>
-            <a:ext cx="2971800" cy="458787"/>
+            <a:off x="0" y="8829968"/>
+            <a:ext cx="3037840" cy="466433"/>
           </a:xfrm>
           <a:prstGeom prst="rect">
             <a:avLst/>
           </a:prstGeom>
         </p:spPr>
         <p:txBody>
-          <a:bodyPr vert="horz" lIns="91440" tIns="45720" rIns="91440" bIns="45720" rtlCol="0" anchor="b"/>
+          <a:bodyPr vert="horz" lIns="93172" tIns="46587" rIns="93172" bIns="46587" rtlCol="0" anchor="b"/>
           <a:lstStyle>
             <a:lvl1pPr algn="l">
               <a:defRPr sz="1200"/>
@@ -301,15 +301,15 @@
         </p:nvSpPr>
         <p:spPr>
           <a:xfrm>
-            <a:off x="3884613" y="8685213"/>
-            <a:ext cx="2971800" cy="458787"/>
+            <a:off x="3970938" y="8829968"/>
+            <a:ext cx="3037840" cy="466433"/>
           </a:xfrm>
           <a:prstGeom prst="rect">
             <a:avLst/>
           </a:prstGeom>
         </p:spPr>
         <p:txBody>
-          <a:bodyPr vert="horz" lIns="91440" tIns="45720" rIns="91440" bIns="45720" rtlCol="0" anchor="b"/>
+          <a:bodyPr vert="horz" lIns="93172" tIns="46587" rIns="93172" bIns="46587" rtlCol="0" anchor="b"/>
           <a:lstStyle>
             <a:lvl1pPr algn="r">
               <a:defRPr sz="1200"/>
@@ -370,14 +370,14 @@
         <p:spPr>
           <a:xfrm>
             <a:off x="0" y="0"/>
-            <a:ext cx="2971800" cy="458788"/>
+            <a:ext cx="3037840" cy="466434"/>
           </a:xfrm>
           <a:prstGeom prst="rect">
             <a:avLst/>
           </a:prstGeom>
         </p:spPr>
         <p:txBody>
-          <a:bodyPr vert="horz" lIns="91440" tIns="45720" rIns="91440" bIns="45720" rtlCol="0"/>
+          <a:bodyPr vert="horz" lIns="93172" tIns="46587" rIns="93172" bIns="46587" rtlCol="0"/>
           <a:lstStyle>
             <a:lvl1pPr algn="l">
               <a:defRPr sz="1200"/>
@@ -400,15 +400,15 @@
         </p:nvSpPr>
         <p:spPr>
           <a:xfrm>
-            <a:off x="3884613" y="0"/>
-            <a:ext cx="2971800" cy="458788"/>
+            <a:off x="3970938" y="0"/>
+            <a:ext cx="3037840" cy="466434"/>
           </a:xfrm>
           <a:prstGeom prst="rect">
             <a:avLst/>
           </a:prstGeom>
         </p:spPr>
         <p:txBody>
-          <a:bodyPr vert="horz" lIns="91440" tIns="45720" rIns="91440" bIns="45720" rtlCol="0"/>
+          <a:bodyPr vert="horz" lIns="93172" tIns="46587" rIns="93172" bIns="46587" rtlCol="0"/>
           <a:lstStyle>
             <a:lvl1pPr algn="r">
               <a:defRPr sz="1200"/>
@@ -417,7 +417,7 @@
           <a:p>
             <a:fld id="{056371FA-A98D-41E8-93F4-09945841298A}" type="datetimeFigureOut">
               <a:rPr lang="en-US" smtClean="0"/>
-              <a:t>12/1/2021</a:t>
+              <a:t>12/2/2021</a:t>
             </a:fld>
             <a:endParaRPr lang="en-US" dirty="0"/>
           </a:p>
@@ -435,8 +435,8 @@
         </p:nvSpPr>
         <p:spPr>
           <a:xfrm>
-            <a:off x="685800" y="1143000"/>
-            <a:ext cx="5486400" cy="3086100"/>
+            <a:off x="717550" y="1162050"/>
+            <a:ext cx="5575300" cy="3136900"/>
           </a:xfrm>
           <a:prstGeom prst="rect">
             <a:avLst/>
@@ -449,7 +449,7 @@
           </a:ln>
         </p:spPr>
         <p:txBody>
-          <a:bodyPr vert="horz" lIns="91440" tIns="45720" rIns="91440" bIns="45720" rtlCol="0" anchor="ctr"/>
+          <a:bodyPr vert="horz" lIns="93172" tIns="46587" rIns="93172" bIns="46587" rtlCol="0" anchor="ctr"/>
           <a:lstStyle/>
           <a:p>
             <a:endParaRPr lang="en-US" dirty="0"/>
@@ -468,15 +468,15 @@
         </p:nvSpPr>
         <p:spPr>
           <a:xfrm>
-            <a:off x="685800" y="4400550"/>
-            <a:ext cx="5486400" cy="3600450"/>
+            <a:off x="701040" y="4473892"/>
+            <a:ext cx="5608320" cy="3660458"/>
           </a:xfrm>
           <a:prstGeom prst="rect">
             <a:avLst/>
           </a:prstGeom>
         </p:spPr>
         <p:txBody>
-          <a:bodyPr vert="horz" lIns="91440" tIns="45720" rIns="91440" bIns="45720" rtlCol="0"/>
+          <a:bodyPr vert="horz" lIns="93172" tIns="46587" rIns="93172" bIns="46587" rtlCol="0"/>
           <a:lstStyle/>
           <a:p>
             <a:pPr lvl="0"/>
@@ -527,15 +527,15 @@
         </p:nvSpPr>
         <p:spPr>
           <a:xfrm>
-            <a:off x="0" y="8685213"/>
-            <a:ext cx="2971800" cy="458787"/>
+            <a:off x="0" y="8829968"/>
+            <a:ext cx="3037840" cy="466433"/>
           </a:xfrm>
           <a:prstGeom prst="rect">
             <a:avLst/>
           </a:prstGeom>
         </p:spPr>
         <p:txBody>
-          <a:bodyPr vert="horz" lIns="91440" tIns="45720" rIns="91440" bIns="45720" rtlCol="0" anchor="b"/>
+          <a:bodyPr vert="horz" lIns="93172" tIns="46587" rIns="93172" bIns="46587" rtlCol="0" anchor="b"/>
           <a:lstStyle>
             <a:lvl1pPr algn="l">
               <a:defRPr sz="1200"/>
@@ -558,15 +558,15 @@
         </p:nvSpPr>
         <p:spPr>
           <a:xfrm>
-            <a:off x="3884613" y="8685213"/>
-            <a:ext cx="2971800" cy="458787"/>
+            <a:off x="3970938" y="8829968"/>
+            <a:ext cx="3037840" cy="466433"/>
           </a:xfrm>
           <a:prstGeom prst="rect">
             <a:avLst/>
           </a:prstGeom>
         </p:spPr>
         <p:txBody>
-          <a:bodyPr vert="horz" lIns="91440" tIns="45720" rIns="91440" bIns="45720" rtlCol="0" anchor="b"/>
+          <a:bodyPr vert="horz" lIns="93172" tIns="46587" rIns="93172" bIns="46587" rtlCol="0" anchor="b"/>
           <a:lstStyle>
             <a:lvl1pPr algn="r">
               <a:defRPr sz="1200"/>
@@ -11725,8 +11725,8 @@
           </p:spPr>
         </p:pic>
       </p:grpSp>
-      <mc:AlternateContent xmlns:mc="http://schemas.openxmlformats.org/markup-compatibility/2006">
-        <mc:Choice xmlns:a14="http://schemas.microsoft.com/office/drawing/2010/main" Requires="a14">
+      <mc:AlternateContent xmlns:mc="http://schemas.openxmlformats.org/markup-compatibility/2006" xmlns:a14="http://schemas.microsoft.com/office/drawing/2010/main">
+        <mc:Choice Requires="a14">
           <p:sp>
             <p:nvSpPr>
               <p:cNvPr id="22" name="Content Placeholder 3">
@@ -13026,7 +13026,7 @@
             </p:txBody>
           </p:sp>
         </mc:Choice>
-        <mc:Fallback>
+        <mc:Fallback xmlns="">
           <p:sp>
             <p:nvSpPr>
               <p:cNvPr id="22" name="Content Placeholder 3">
@@ -13403,14 +13403,7 @@
               </a:lnSpc>
             </a:pPr>
             <a:r>
-              <a:rPr lang="en-US" sz="1400" spc="50" dirty="0">
-                <a:solidFill>
-                  <a:schemeClr val="tx1">
-                    <a:lumMod val="50000"/>
-                    <a:lumOff val="50000"/>
-                  </a:schemeClr>
-                </a:solidFill>
-              </a:rPr>
+              <a:rPr lang="en-US" sz="1400" spc="50" dirty="0"/>
               <a:t>Ridge Regression</a:t>
             </a:r>
           </a:p>
@@ -13421,14 +13414,7 @@
               </a:lnSpc>
             </a:pPr>
             <a:r>
-              <a:rPr lang="en-US" sz="1400" spc="50" dirty="0">
-                <a:solidFill>
-                  <a:schemeClr val="tx1">
-                    <a:lumMod val="50000"/>
-                    <a:lumOff val="50000"/>
-                  </a:schemeClr>
-                </a:solidFill>
-              </a:rPr>
+              <a:rPr lang="en-US" sz="1400" spc="50" dirty="0"/>
               <a:t>Lasso Regression</a:t>
             </a:r>
           </a:p>
@@ -13498,8 +13484,8 @@
           </a:p>
         </p:txBody>
       </p:sp>
-      <mc:AlternateContent xmlns:mc="http://schemas.openxmlformats.org/markup-compatibility/2006">
-        <mc:Choice xmlns:a14="http://schemas.microsoft.com/office/drawing/2010/main" Requires="a14">
+      <mc:AlternateContent xmlns:mc="http://schemas.openxmlformats.org/markup-compatibility/2006" xmlns:a14="http://schemas.microsoft.com/office/drawing/2010/main">
+        <mc:Choice Requires="a14">
           <p:sp>
             <p:nvSpPr>
               <p:cNvPr id="12" name="Content Placeholder 3">
@@ -13890,7 +13876,7 @@
             </p:txBody>
           </p:sp>
         </mc:Choice>
-        <mc:Fallback>
+        <mc:Fallback xmlns="">
           <p:sp>
             <p:nvSpPr>
               <p:cNvPr id="12" name="Content Placeholder 3">
@@ -15967,6 +15953,25 @@
 </file>
 
 <file path=customXml/item2.xml><?xml version="1.0" encoding="utf-8"?>
+<p:properties xmlns:p="http://schemas.microsoft.com/office/2006/metadata/properties" xmlns:xsi="http://www.w3.org/2001/XMLSchema-instance" xmlns:pc="http://schemas.microsoft.com/office/infopath/2007/PartnerControls">
+  <documentManagement>
+    <_ip_UnifiedCompliancePolicyUIAction xmlns="http://schemas.microsoft.com/sharepoint/v3" xsi:nil="true"/>
+    <Image xmlns="71af3243-3dd4-4a8d-8c0d-dd76da1f02a5">
+      <Url xsi:nil="true"/>
+      <Description xsi:nil="true"/>
+    </Image>
+    <Status xmlns="71af3243-3dd4-4a8d-8c0d-dd76da1f02a5">Not started</Status>
+    <_ip_UnifiedCompliancePolicyProperties xmlns="http://schemas.microsoft.com/sharepoint/v3" xsi:nil="true"/>
+    <ImageTagsTaxHTField xmlns="71af3243-3dd4-4a8d-8c0d-dd76da1f02a5">
+      <Terms xmlns="http://schemas.microsoft.com/office/infopath/2007/PartnerControls"/>
+    </ImageTagsTaxHTField>
+    <TaxCatchAll xmlns="230e9df3-be65-4c73-a93b-d1236ebd677e"/>
+    <MediaServiceKeyPoints xmlns="71af3243-3dd4-4a8d-8c0d-dd76da1f02a5" xsi:nil="true"/>
+  </documentManagement>
+</p:properties>
+</file>
+
+<file path=customXml/item3.xml><?xml version="1.0" encoding="utf-8"?>
 <ct:contentTypeSchema xmlns:ct="http://schemas.microsoft.com/office/2006/metadata/contentType" xmlns:ma="http://schemas.microsoft.com/office/2006/metadata/properties/metaAttributes" ct:_="" ma:_="" ma:contentTypeName="Document" ma:contentTypeID="0x01010079F111ED35F8CC479449609E8A0923A6" ma:contentTypeVersion="20" ma:contentTypeDescription="Create a new document." ma:contentTypeScope="" ma:versionID="1267097ee5f5874adfcc408041ae252e">
   <xsd:schema xmlns:xsd="http://www.w3.org/2001/XMLSchema" xmlns:xs="http://www.w3.org/2001/XMLSchema" xmlns:p="http://schemas.microsoft.com/office/2006/metadata/properties" xmlns:ns1="http://schemas.microsoft.com/sharepoint/v3" xmlns:ns2="71af3243-3dd4-4a8d-8c0d-dd76da1f02a5" xmlns:ns3="16c05727-aa75-4e4a-9b5f-8a80a1165891" xmlns:ns4="230e9df3-be65-4c73-a93b-d1236ebd677e" targetNamespace="http://schemas.microsoft.com/office/2006/metadata/properties" ma:root="true" ma:fieldsID="395891a93df65b14727750f2c06c306c" ns1:_="" ns2:_="" ns3:_="" ns4:_="">
     <xsd:import namespace="http://schemas.microsoft.com/sharepoint/v3"/>
@@ -16242,25 +16247,6 @@
 </ct:contentTypeSchema>
 </file>
 
-<file path=customXml/item3.xml><?xml version="1.0" encoding="utf-8"?>
-<p:properties xmlns:p="http://schemas.microsoft.com/office/2006/metadata/properties" xmlns:xsi="http://www.w3.org/2001/XMLSchema-instance" xmlns:pc="http://schemas.microsoft.com/office/infopath/2007/PartnerControls">
-  <documentManagement>
-    <_ip_UnifiedCompliancePolicyUIAction xmlns="http://schemas.microsoft.com/sharepoint/v3" xsi:nil="true"/>
-    <Image xmlns="71af3243-3dd4-4a8d-8c0d-dd76da1f02a5">
-      <Url xsi:nil="true"/>
-      <Description xsi:nil="true"/>
-    </Image>
-    <Status xmlns="71af3243-3dd4-4a8d-8c0d-dd76da1f02a5">Not started</Status>
-    <_ip_UnifiedCompliancePolicyProperties xmlns="http://schemas.microsoft.com/sharepoint/v3" xsi:nil="true"/>
-    <ImageTagsTaxHTField xmlns="71af3243-3dd4-4a8d-8c0d-dd76da1f02a5">
-      <Terms xmlns="http://schemas.microsoft.com/office/infopath/2007/PartnerControls"/>
-    </ImageTagsTaxHTField>
-    <TaxCatchAll xmlns="230e9df3-be65-4c73-a93b-d1236ebd677e"/>
-    <MediaServiceKeyPoints xmlns="71af3243-3dd4-4a8d-8c0d-dd76da1f02a5" xsi:nil="true"/>
-  </documentManagement>
-</p:properties>
-</file>
-
 <file path=customXml/itemProps1.xml><?xml version="1.0" encoding="utf-8"?>
 <ds:datastoreItem xmlns:ds="http://schemas.openxmlformats.org/officeDocument/2006/customXml" ds:itemID="{0FD6FE22-81A0-4500-AFD0-342D21BB9A2C}">
   <ds:schemaRefs>
@@ -16270,6 +16256,25 @@
 </file>
 
 <file path=customXml/itemProps2.xml><?xml version="1.0" encoding="utf-8"?>
+<ds:datastoreItem xmlns:ds="http://schemas.openxmlformats.org/officeDocument/2006/customXml" ds:itemID="{29C43685-694E-4579-B109-3C418D49DA65}">
+  <ds:schemaRefs>
+    <ds:schemaRef ds:uri="http://purl.org/dc/terms/"/>
+    <ds:schemaRef ds:uri="http://schemas.microsoft.com/office/2006/documentManagement/types"/>
+    <ds:schemaRef ds:uri="http://purl.org/dc/elements/1.1/"/>
+    <ds:schemaRef ds:uri="http://schemas.microsoft.com/office/2006/metadata/properties"/>
+    <ds:schemaRef ds:uri="http://purl.org/dc/dcmitype/"/>
+    <ds:schemaRef ds:uri="http://schemas.microsoft.com/office/infopath/2007/PartnerControls"/>
+    <ds:schemaRef ds:uri="http://schemas.openxmlformats.org/package/2006/metadata/core-properties"/>
+    <ds:schemaRef ds:uri="71af3243-3dd4-4a8d-8c0d-dd76da1f02a5"/>
+    <ds:schemaRef ds:uri="230e9df3-be65-4c73-a93b-d1236ebd677e"/>
+    <ds:schemaRef ds:uri="16c05727-aa75-4e4a-9b5f-8a80a1165891"/>
+    <ds:schemaRef ds:uri="http://schemas.microsoft.com/sharepoint/v3"/>
+    <ds:schemaRef ds:uri="http://www.w3.org/XML/1998/namespace"/>
+  </ds:schemaRefs>
+</ds:datastoreItem>
+</file>
+
+<file path=customXml/itemProps3.xml><?xml version="1.0" encoding="utf-8"?>
 <ds:datastoreItem xmlns:ds="http://schemas.openxmlformats.org/officeDocument/2006/customXml" ds:itemID="{CC96B61E-1B64-430F-934F-7D1B90028029}">
   <ds:schemaRefs>
     <ds:schemaRef ds:uri="http://schemas.microsoft.com/office/2006/metadata/contentType"/>
@@ -16290,25 +16295,6 @@
 </ds:datastoreItem>
 </file>
 
-<file path=customXml/itemProps3.xml><?xml version="1.0" encoding="utf-8"?>
-<ds:datastoreItem xmlns:ds="http://schemas.openxmlformats.org/officeDocument/2006/customXml" ds:itemID="{29C43685-694E-4579-B109-3C418D49DA65}">
-  <ds:schemaRefs>
-    <ds:schemaRef ds:uri="http://purl.org/dc/terms/"/>
-    <ds:schemaRef ds:uri="16c05727-aa75-4e4a-9b5f-8a80a1165891"/>
-    <ds:schemaRef ds:uri="http://www.w3.org/XML/1998/namespace"/>
-    <ds:schemaRef ds:uri="230e9df3-be65-4c73-a93b-d1236ebd677e"/>
-    <ds:schemaRef ds:uri="http://schemas.microsoft.com/office/2006/documentManagement/types"/>
-    <ds:schemaRef ds:uri="http://purl.org/dc/elements/1.1/"/>
-    <ds:schemaRef ds:uri="http://schemas.openxmlformats.org/package/2006/metadata/core-properties"/>
-    <ds:schemaRef ds:uri="http://schemas.microsoft.com/office/infopath/2007/PartnerControls"/>
-    <ds:schemaRef ds:uri="71af3243-3dd4-4a8d-8c0d-dd76da1f02a5"/>
-    <ds:schemaRef ds:uri="http://schemas.microsoft.com/sharepoint/v3"/>
-    <ds:schemaRef ds:uri="http://schemas.microsoft.com/office/2006/metadata/properties"/>
-    <ds:schemaRef ds:uri="http://purl.org/dc/dcmitype/"/>
-  </ds:schemaRefs>
-</ds:datastoreItem>
-</file>
-
 <file path=docMetadata/LabelInfo.xml><?xml version="1.0" encoding="utf-8"?>
 <clbl:labelList xmlns:clbl="http://schemas.microsoft.com/office/2020/mipLabelMetadata">
   <clbl:label id="{f42aa342-8706-4288-bd11-ebb85995028c}" enabled="1" method="Standard" siteId="{72f988bf-86f1-41af-91ab-2d7cd011db47}" removed="0"/>

</xml_diff>

<commit_message>
Adding finalized thesis, final models, updating code to be cleaner, adding additional papers to lit review and adding presentation materials and figures.
</commit_message>
<xml_diff>
--- a/ThesisPresentation.pptx
+++ b/ThesisPresentation.pptx
@@ -240,7 +240,7 @@
           <a:p>
             <a:fld id="{B56F32FC-4BD9-442A-A8C6-51598C909FE3}" type="datetimeFigureOut">
               <a:rPr lang="en-US" smtClean="0"/>
-              <a:t>12/2/2021</a:t>
+              <a:t>12/7/2021</a:t>
             </a:fld>
             <a:endParaRPr lang="en-US" dirty="0"/>
           </a:p>
@@ -417,7 +417,7 @@
           <a:p>
             <a:fld id="{056371FA-A98D-41E8-93F4-09945841298A}" type="datetimeFigureOut">
               <a:rPr lang="en-US" smtClean="0"/>
-              <a:t>12/2/2021</a:t>
+              <a:t>12/7/2021</a:t>
             </a:fld>
             <a:endParaRPr lang="en-US" dirty="0"/>
           </a:p>
@@ -15944,15 +15944,6 @@
 </file>
 
 <file path=customXml/item1.xml><?xml version="1.0" encoding="utf-8"?>
-<?mso-contentType ?>
-<FormTemplates xmlns="http://schemas.microsoft.com/sharepoint/v3/contenttype/forms">
-  <Display>DocumentLibraryForm</Display>
-  <Edit>DocumentLibraryForm</Edit>
-  <New>DocumentLibraryForm</New>
-</FormTemplates>
-</file>
-
-<file path=customXml/item2.xml><?xml version="1.0" encoding="utf-8"?>
 <p:properties xmlns:p="http://schemas.microsoft.com/office/2006/metadata/properties" xmlns:xsi="http://www.w3.org/2001/XMLSchema-instance" xmlns:pc="http://schemas.microsoft.com/office/infopath/2007/PartnerControls">
   <documentManagement>
     <_ip_UnifiedCompliancePolicyUIAction xmlns="http://schemas.microsoft.com/sharepoint/v3" xsi:nil="true"/>
@@ -15969,6 +15960,15 @@
     <MediaServiceKeyPoints xmlns="71af3243-3dd4-4a8d-8c0d-dd76da1f02a5" xsi:nil="true"/>
   </documentManagement>
 </p:properties>
+</file>
+
+<file path=customXml/item2.xml><?xml version="1.0" encoding="utf-8"?>
+<?mso-contentType ?>
+<FormTemplates xmlns="http://schemas.microsoft.com/sharepoint/v3/contenttype/forms">
+  <Display>DocumentLibraryForm</Display>
+  <Edit>DocumentLibraryForm</Edit>
+  <New>DocumentLibraryForm</New>
+</FormTemplates>
 </file>
 
 <file path=customXml/item3.xml><?xml version="1.0" encoding="utf-8"?>
@@ -16248,14 +16248,6 @@
 </file>
 
 <file path=customXml/itemProps1.xml><?xml version="1.0" encoding="utf-8"?>
-<ds:datastoreItem xmlns:ds="http://schemas.openxmlformats.org/officeDocument/2006/customXml" ds:itemID="{0FD6FE22-81A0-4500-AFD0-342D21BB9A2C}">
-  <ds:schemaRefs>
-    <ds:schemaRef ds:uri="http://schemas.microsoft.com/sharepoint/v3/contenttype/forms"/>
-  </ds:schemaRefs>
-</ds:datastoreItem>
-</file>
-
-<file path=customXml/itemProps2.xml><?xml version="1.0" encoding="utf-8"?>
 <ds:datastoreItem xmlns:ds="http://schemas.openxmlformats.org/officeDocument/2006/customXml" ds:itemID="{29C43685-694E-4579-B109-3C418D49DA65}">
   <ds:schemaRefs>
     <ds:schemaRef ds:uri="http://purl.org/dc/terms/"/>
@@ -16270,6 +16262,14 @@
     <ds:schemaRef ds:uri="16c05727-aa75-4e4a-9b5f-8a80a1165891"/>
     <ds:schemaRef ds:uri="http://schemas.microsoft.com/sharepoint/v3"/>
     <ds:schemaRef ds:uri="http://www.w3.org/XML/1998/namespace"/>
+  </ds:schemaRefs>
+</ds:datastoreItem>
+</file>
+
+<file path=customXml/itemProps2.xml><?xml version="1.0" encoding="utf-8"?>
+<ds:datastoreItem xmlns:ds="http://schemas.openxmlformats.org/officeDocument/2006/customXml" ds:itemID="{0FD6FE22-81A0-4500-AFD0-342D21BB9A2C}">
+  <ds:schemaRefs>
+    <ds:schemaRef ds:uri="http://schemas.microsoft.com/sharepoint/v3/contenttype/forms"/>
   </ds:schemaRefs>
 </ds:datastoreItem>
 </file>

</xml_diff>